<commit_message>
minor corrections to presentation
</commit_message>
<xml_diff>
--- a/presentation/deep_learning_crash_course.pptx
+++ b/presentation/deep_learning_crash_course.pptx
@@ -118,6 +118,11 @@
       </a:defRPr>
     </a:lvl9pPr>
   </p:defaultTextStyle>
+  <p:extLst>
+    <p:ext uri="{EFAFB233-063F-42B5-8137-9DF3F51BA10A}">
+      <p15:sldGuideLst xmlns:p15="http://schemas.microsoft.com/office/powerpoint/2012/main"/>
+    </p:ext>
+  </p:extLst>
 </p:presentation>
 </file>
 
@@ -1927,7 +1932,7 @@
                 </a:solidFill>
                 <a:latin typeface="Calibri"/>
               </a:rPr>
-              <a:t>1/2/2021</a:t>
+              <a:t>1/6/2021</a:t>
             </a:fld>
             <a:endParaRPr lang="en-CA" sz="1200" b="0" strike="noStrike" spc="-1">
               <a:latin typeface="Times New Roman"/>
@@ -3410,7 +3415,7 @@
                 </a:solidFill>
                 <a:latin typeface="Calibri"/>
               </a:rPr>
-              <a:t>what real problem are we trying to solve?</a:t>
+              <a:t>What real problem are we trying to solve?</a:t>
             </a:r>
             <a:endParaRPr lang="en-US" sz="2800" spc="-1" dirty="0">
               <a:solidFill>
@@ -3440,7 +3445,7 @@
                 </a:solidFill>
                 <a:latin typeface="Calibri"/>
               </a:rPr>
-              <a:t>what type of deep learning task does this problem fall into?</a:t>
+              <a:t>What type of deep learning task does this problem fall into?</a:t>
             </a:r>
             <a:endParaRPr lang="en-US" sz="2800" spc="-1" dirty="0">
               <a:solidFill>
@@ -3470,7 +3475,7 @@
                 </a:solidFill>
                 <a:latin typeface="Calibri"/>
               </a:rPr>
-              <a:t>what information is required to solve the problem?</a:t>
+              <a:t>What information is required to solve the problem?</a:t>
             </a:r>
           </a:p>
         </p:txBody>
@@ -5059,7 +5064,7 @@
                 </a:solidFill>
                 <a:latin typeface="Calibri"/>
               </a:rPr>
-              <a:t>neural network with multiple </a:t>
+              <a:t>Neural network with multiple </a:t>
             </a:r>
             <a:r>
               <a:rPr lang="en-US" sz="2800" b="1" spc="-1" dirty="0">
@@ -5095,7 +5100,7 @@
                 </a:solidFill>
                 <a:latin typeface="Calibri"/>
               </a:rPr>
-              <a:t>understanding </a:t>
+              <a:t>Understanding </a:t>
             </a:r>
             <a:r>
               <a:rPr lang="en-US" sz="2800" b="1" spc="-1" dirty="0">
@@ -5616,7 +5621,7 @@
                 </a:solidFill>
                 <a:latin typeface="Calibri"/>
               </a:rPr>
-              <a:t>We can perform tensor operations such as addition, multiplication, dot product to transform our input data.</a:t>
+              <a:t>We can perform tensor operations such as addition, multiplication and dot product to transform our input data.</a:t>
             </a:r>
             <a:endParaRPr lang="en-US" sz="3200" spc="-1" dirty="0">
               <a:solidFill>
@@ -5735,8 +5740,8 @@
           </a:p>
         </p:txBody>
       </p:sp>
-      <mc:AlternateContent xmlns:mc="http://schemas.openxmlformats.org/markup-compatibility/2006">
-        <mc:Choice xmlns:a14="http://schemas.microsoft.com/office/drawing/2010/main" Requires="a14">
+      <mc:AlternateContent xmlns:mc="http://schemas.openxmlformats.org/markup-compatibility/2006" xmlns:a14="http://schemas.microsoft.com/office/drawing/2010/main">
+        <mc:Choice Requires="a14">
           <p:sp>
             <p:nvSpPr>
               <p:cNvPr id="56" name="TextShape 2"/>
@@ -6128,7 +6133,7 @@
             </p:txBody>
           </p:sp>
         </mc:Choice>
-        <mc:Fallback>
+        <mc:Fallback xmlns="">
           <p:sp>
             <p:nvSpPr>
               <p:cNvPr id="56" name="TextShape 2"/>
@@ -6431,7 +6436,7 @@
                 </a:solidFill>
                 <a:latin typeface="Calibri"/>
               </a:rPr>
-              <a:t>loss function (compute how well the network performed on a subset of the training data)</a:t>
+              <a:t>Loss function (compute how well the network performed on a subset of the training data)</a:t>
             </a:r>
             <a:endParaRPr lang="en-US" sz="2400" spc="-1" dirty="0">
               <a:solidFill>
@@ -6461,7 +6466,7 @@
                 </a:solidFill>
                 <a:latin typeface="Calibri"/>
               </a:rPr>
-              <a:t>gradient descent (adjust the network parameter based on the output of the loss function)</a:t>
+              <a:t>Gradient descent (adjust the network parameter based on the output of the loss function)</a:t>
             </a:r>
           </a:p>
           <a:p>

</xml_diff>